<commit_message>
add bar chart to ranking
</commit_message>
<xml_diff>
--- a/Glassdoor Presentation.pptx
+++ b/Glassdoor Presentation.pptx
@@ -846,7 +846,7 @@
           <a:p>
             <a:fld id="{05A061D8-88AA-45DE-B5D1-C0571CF3170B}" type="datetimeFigureOut">
               <a:rPr lang="en-US" smtClean="0"/>
-              <a:t>10/14/2019</a:t>
+              <a:t>10/19/2019</a:t>
             </a:fld>
             <a:endParaRPr lang="en-US"/>
           </a:p>
@@ -1097,7 +1097,7 @@
           <a:p>
             <a:fld id="{05A061D8-88AA-45DE-B5D1-C0571CF3170B}" type="datetimeFigureOut">
               <a:rPr lang="en-US" smtClean="0"/>
-              <a:t>10/14/2019</a:t>
+              <a:t>10/19/2019</a:t>
             </a:fld>
             <a:endParaRPr lang="en-US"/>
           </a:p>
@@ -1411,7 +1411,7 @@
           <a:p>
             <a:fld id="{05A061D8-88AA-45DE-B5D1-C0571CF3170B}" type="datetimeFigureOut">
               <a:rPr lang="en-US" smtClean="0"/>
-              <a:t>10/14/2019</a:t>
+              <a:t>10/19/2019</a:t>
             </a:fld>
             <a:endParaRPr lang="en-US"/>
           </a:p>
@@ -1752,7 +1752,7 @@
           <a:p>
             <a:fld id="{05A061D8-88AA-45DE-B5D1-C0571CF3170B}" type="datetimeFigureOut">
               <a:rPr lang="en-US" smtClean="0"/>
-              <a:t>10/14/2019</a:t>
+              <a:t>10/19/2019</a:t>
             </a:fld>
             <a:endParaRPr lang="en-US"/>
           </a:p>
@@ -2066,7 +2066,7 @@
           <a:p>
             <a:fld id="{05A061D8-88AA-45DE-B5D1-C0571CF3170B}" type="datetimeFigureOut">
               <a:rPr lang="en-US" smtClean="0"/>
-              <a:t>10/14/2019</a:t>
+              <a:t>10/19/2019</a:t>
             </a:fld>
             <a:endParaRPr lang="en-US"/>
           </a:p>
@@ -2459,7 +2459,7 @@
           <a:p>
             <a:fld id="{05A061D8-88AA-45DE-B5D1-C0571CF3170B}" type="datetimeFigureOut">
               <a:rPr lang="en-US" smtClean="0"/>
-              <a:t>10/14/2019</a:t>
+              <a:t>10/19/2019</a:t>
             </a:fld>
             <a:endParaRPr lang="en-US"/>
           </a:p>
@@ -2629,7 +2629,7 @@
           <a:p>
             <a:fld id="{05A061D8-88AA-45DE-B5D1-C0571CF3170B}" type="datetimeFigureOut">
               <a:rPr lang="en-US" smtClean="0"/>
-              <a:t>10/14/2019</a:t>
+              <a:t>10/19/2019</a:t>
             </a:fld>
             <a:endParaRPr lang="en-US"/>
           </a:p>
@@ -2809,7 +2809,7 @@
           <a:p>
             <a:fld id="{05A061D8-88AA-45DE-B5D1-C0571CF3170B}" type="datetimeFigureOut">
               <a:rPr lang="en-US" smtClean="0"/>
-              <a:t>10/14/2019</a:t>
+              <a:t>10/19/2019</a:t>
             </a:fld>
             <a:endParaRPr lang="en-US"/>
           </a:p>
@@ -2938,7 +2938,7 @@
           <a:p>
             <a:fld id="{05A061D8-88AA-45DE-B5D1-C0571CF3170B}" type="datetimeFigureOut">
               <a:rPr lang="en-US" smtClean="0"/>
-              <a:t>10/14/2019</a:t>
+              <a:t>10/19/2019</a:t>
             </a:fld>
             <a:endParaRPr lang="en-US"/>
           </a:p>
@@ -3079,7 +3079,7 @@
           <a:p>
             <a:fld id="{05A061D8-88AA-45DE-B5D1-C0571CF3170B}" type="datetimeFigureOut">
               <a:rPr lang="en-US" smtClean="0"/>
-              <a:t>10/14/2019</a:t>
+              <a:t>10/19/2019</a:t>
             </a:fld>
             <a:endParaRPr lang="en-US"/>
           </a:p>
@@ -3299,7 +3299,7 @@
           <a:p>
             <a:fld id="{50A04D72-8E1E-4915-91EF-BF2D9BA8D8AF}" type="datetimeFigureOut">
               <a:rPr lang="en-US" smtClean="0"/>
-              <a:t>10/14/2019</a:t>
+              <a:t>10/19/2019</a:t>
             </a:fld>
             <a:endParaRPr lang="en-US"/>
           </a:p>
@@ -3487,7 +3487,7 @@
           <a:p>
             <a:fld id="{05A061D8-88AA-45DE-B5D1-C0571CF3170B}" type="datetimeFigureOut">
               <a:rPr lang="en-US" smtClean="0"/>
-              <a:t>10/14/2019</a:t>
+              <a:t>10/19/2019</a:t>
             </a:fld>
             <a:endParaRPr lang="en-US"/>
           </a:p>
@@ -3673,7 +3673,7 @@
           <a:p>
             <a:fld id="{50A04D72-8E1E-4915-91EF-BF2D9BA8D8AF}" type="datetimeFigureOut">
               <a:rPr lang="en-US" smtClean="0"/>
-              <a:t>10/14/2019</a:t>
+              <a:t>10/19/2019</a:t>
             </a:fld>
             <a:endParaRPr lang="en-US"/>
           </a:p>
@@ -3948,7 +3948,7 @@
           <a:p>
             <a:fld id="{50A04D72-8E1E-4915-91EF-BF2D9BA8D8AF}" type="datetimeFigureOut">
               <a:rPr lang="en-US" smtClean="0"/>
-              <a:t>10/14/2019</a:t>
+              <a:t>10/19/2019</a:t>
             </a:fld>
             <a:endParaRPr lang="en-US"/>
           </a:p>
@@ -4213,7 +4213,7 @@
           <a:p>
             <a:fld id="{50A04D72-8E1E-4915-91EF-BF2D9BA8D8AF}" type="datetimeFigureOut">
               <a:rPr lang="en-US" smtClean="0"/>
-              <a:t>10/14/2019</a:t>
+              <a:t>10/19/2019</a:t>
             </a:fld>
             <a:endParaRPr lang="en-US"/>
           </a:p>
@@ -4625,7 +4625,7 @@
           <a:p>
             <a:fld id="{50A04D72-8E1E-4915-91EF-BF2D9BA8D8AF}" type="datetimeFigureOut">
               <a:rPr lang="en-US" smtClean="0"/>
-              <a:t>10/14/2019</a:t>
+              <a:t>10/19/2019</a:t>
             </a:fld>
             <a:endParaRPr lang="en-US"/>
           </a:p>
@@ -4766,7 +4766,7 @@
           <a:p>
             <a:fld id="{50A04D72-8E1E-4915-91EF-BF2D9BA8D8AF}" type="datetimeFigureOut">
               <a:rPr lang="en-US" smtClean="0"/>
-              <a:t>10/14/2019</a:t>
+              <a:t>10/19/2019</a:t>
             </a:fld>
             <a:endParaRPr lang="en-US"/>
           </a:p>
@@ -4879,7 +4879,7 @@
           <a:p>
             <a:fld id="{50A04D72-8E1E-4915-91EF-BF2D9BA8D8AF}" type="datetimeFigureOut">
               <a:rPr lang="en-US" smtClean="0"/>
-              <a:t>10/14/2019</a:t>
+              <a:t>10/19/2019</a:t>
             </a:fld>
             <a:endParaRPr lang="en-US"/>
           </a:p>
@@ -5190,7 +5190,7 @@
           <a:p>
             <a:fld id="{50A04D72-8E1E-4915-91EF-BF2D9BA8D8AF}" type="datetimeFigureOut">
               <a:rPr lang="en-US" smtClean="0"/>
-              <a:t>10/14/2019</a:t>
+              <a:t>10/19/2019</a:t>
             </a:fld>
             <a:endParaRPr lang="en-US"/>
           </a:p>
@@ -5478,7 +5478,7 @@
           <a:p>
             <a:fld id="{50A04D72-8E1E-4915-91EF-BF2D9BA8D8AF}" type="datetimeFigureOut">
               <a:rPr lang="en-US" smtClean="0"/>
-              <a:t>10/14/2019</a:t>
+              <a:t>10/19/2019</a:t>
             </a:fld>
             <a:endParaRPr lang="en-US"/>
           </a:p>
@@ -5676,7 +5676,7 @@
           <a:p>
             <a:fld id="{50A04D72-8E1E-4915-91EF-BF2D9BA8D8AF}" type="datetimeFigureOut">
               <a:rPr lang="en-US" smtClean="0"/>
-              <a:t>10/14/2019</a:t>
+              <a:t>10/19/2019</a:t>
             </a:fld>
             <a:endParaRPr lang="en-US"/>
           </a:p>
@@ -5884,7 +5884,7 @@
           <a:p>
             <a:fld id="{50A04D72-8E1E-4915-91EF-BF2D9BA8D8AF}" type="datetimeFigureOut">
               <a:rPr lang="en-US" smtClean="0"/>
-              <a:t>10/14/2019</a:t>
+              <a:t>10/19/2019</a:t>
             </a:fld>
             <a:endParaRPr lang="en-US"/>
           </a:p>
@@ -6143,7 +6143,7 @@
           <a:p>
             <a:fld id="{05A061D8-88AA-45DE-B5D1-C0571CF3170B}" type="datetimeFigureOut">
               <a:rPr lang="en-US" smtClean="0"/>
-              <a:t>10/14/2019</a:t>
+              <a:t>10/19/2019</a:t>
             </a:fld>
             <a:endParaRPr lang="en-US"/>
           </a:p>
@@ -6375,7 +6375,7 @@
           <a:p>
             <a:fld id="{05A061D8-88AA-45DE-B5D1-C0571CF3170B}" type="datetimeFigureOut">
               <a:rPr lang="en-US" smtClean="0"/>
-              <a:t>10/14/2019</a:t>
+              <a:t>10/19/2019</a:t>
             </a:fld>
             <a:endParaRPr lang="en-US"/>
           </a:p>
@@ -6749,7 +6749,7 @@
           <a:p>
             <a:fld id="{05A061D8-88AA-45DE-B5D1-C0571CF3170B}" type="datetimeFigureOut">
               <a:rPr lang="en-US" smtClean="0"/>
-              <a:t>10/14/2019</a:t>
+              <a:t>10/19/2019</a:t>
             </a:fld>
             <a:endParaRPr lang="en-US"/>
           </a:p>
@@ -6872,7 +6872,7 @@
           <a:p>
             <a:fld id="{05A061D8-88AA-45DE-B5D1-C0571CF3170B}" type="datetimeFigureOut">
               <a:rPr lang="en-US" smtClean="0"/>
-              <a:t>10/14/2019</a:t>
+              <a:t>10/19/2019</a:t>
             </a:fld>
             <a:endParaRPr lang="en-US"/>
           </a:p>
@@ -6967,7 +6967,7 @@
           <a:p>
             <a:fld id="{05A061D8-88AA-45DE-B5D1-C0571CF3170B}" type="datetimeFigureOut">
               <a:rPr lang="en-US" smtClean="0"/>
-              <a:t>10/14/2019</a:t>
+              <a:t>10/19/2019</a:t>
             </a:fld>
             <a:endParaRPr lang="en-US"/>
           </a:p>
@@ -7222,7 +7222,7 @@
           <a:p>
             <a:fld id="{05A061D8-88AA-45DE-B5D1-C0571CF3170B}" type="datetimeFigureOut">
               <a:rPr lang="en-US" smtClean="0"/>
-              <a:t>10/14/2019</a:t>
+              <a:t>10/19/2019</a:t>
             </a:fld>
             <a:endParaRPr lang="en-US"/>
           </a:p>
@@ -7485,7 +7485,7 @@
           <a:p>
             <a:fld id="{05A061D8-88AA-45DE-B5D1-C0571CF3170B}" type="datetimeFigureOut">
               <a:rPr lang="en-US" smtClean="0"/>
-              <a:t>10/14/2019</a:t>
+              <a:t>10/19/2019</a:t>
             </a:fld>
             <a:endParaRPr lang="en-US"/>
           </a:p>
@@ -8228,7 +8228,7 @@
           <a:p>
             <a:fld id="{05A061D8-88AA-45DE-B5D1-C0571CF3170B}" type="datetimeFigureOut">
               <a:rPr lang="en-US" smtClean="0"/>
-              <a:t>10/14/2019</a:t>
+              <a:t>10/19/2019</a:t>
             </a:fld>
             <a:endParaRPr lang="en-US"/>
           </a:p>
@@ -8905,7 +8905,7 @@
           <a:p>
             <a:fld id="{50A04D72-8E1E-4915-91EF-BF2D9BA8D8AF}" type="datetimeFigureOut">
               <a:rPr lang="en-US" smtClean="0"/>
-              <a:t>10/14/2019</a:t>
+              <a:t>10/19/2019</a:t>
             </a:fld>
             <a:endParaRPr lang="en-US"/>
           </a:p>
@@ -12991,53 +12991,6 @@
           <a:chExt cx="0" cy="0"/>
         </a:xfrm>
       </p:grpSpPr>
-      <p:pic>
-        <p:nvPicPr>
-          <p:cNvPr id="9218" name="Picture 2">
-            <a:extLst>
-              <a:ext uri="{FF2B5EF4-FFF2-40B4-BE49-F238E27FC236}">
-                <a16:creationId xmlns:a16="http://schemas.microsoft.com/office/drawing/2014/main" id="{0B85D224-A518-440B-BB2B-D7ECD2B1FCF4}"/>
-              </a:ext>
-            </a:extLst>
-          </p:cNvPr>
-          <p:cNvPicPr>
-            <a:picLocks noChangeAspect="1" noChangeArrowheads="1"/>
-          </p:cNvPicPr>
-          <p:nvPr/>
-        </p:nvPicPr>
-        <p:blipFill>
-          <a:blip r:embed="rId2">
-            <a:extLst>
-              <a:ext uri="{28A0092B-C50C-407E-A947-70E740481C1C}">
-                <a14:useLocalDpi xmlns:a14="http://schemas.microsoft.com/office/drawing/2010/main" val="0"/>
-              </a:ext>
-            </a:extLst>
-          </a:blip>
-          <a:srcRect/>
-          <a:stretch>
-            <a:fillRect/>
-          </a:stretch>
-        </p:blipFill>
-        <p:spPr bwMode="auto">
-          <a:xfrm>
-            <a:off x="3462338" y="2019300"/>
-            <a:ext cx="3552825" cy="2552700"/>
-          </a:xfrm>
-          <a:prstGeom prst="rect">
-            <a:avLst/>
-          </a:prstGeom>
-          <a:noFill/>
-          <a:extLst>
-            <a:ext uri="{909E8E84-426E-40DD-AFC4-6F175D3DCCD1}">
-              <a14:hiddenFill xmlns:a14="http://schemas.microsoft.com/office/drawing/2010/main">
-                <a:solidFill>
-                  <a:srgbClr val="FFFFFF"/>
-                </a:solidFill>
-              </a14:hiddenFill>
-            </a:ext>
-          </a:extLst>
-        </p:spPr>
-      </p:pic>
       <p:sp>
         <p:nvSpPr>
           <p:cNvPr id="5" name="Rectangle 4">
@@ -13127,10 +13080,10 @@
       </p:sp>
       <p:sp>
         <p:nvSpPr>
-          <p:cNvPr id="4" name="TextBox 3">
-            <a:extLst>
-              <a:ext uri="{FF2B5EF4-FFF2-40B4-BE49-F238E27FC236}">
-                <a16:creationId xmlns:a16="http://schemas.microsoft.com/office/drawing/2014/main" id="{B7C495E4-A557-442C-81CB-8898E502C66D}"/>
+          <p:cNvPr id="13" name="TextBox 12">
+            <a:extLst>
+              <a:ext uri="{FF2B5EF4-FFF2-40B4-BE49-F238E27FC236}">
+                <a16:creationId xmlns:a16="http://schemas.microsoft.com/office/drawing/2014/main" id="{BCC03D83-F00D-42E8-B8FF-4677A0AA8A2A}"/>
               </a:ext>
             </a:extLst>
           </p:cNvPr>
@@ -13139,8 +13092,8 @@
         </p:nvSpPr>
         <p:spPr>
           <a:xfrm>
-            <a:off x="3930162" y="4572000"/>
-            <a:ext cx="2905347" cy="369332"/>
+            <a:off x="2063039" y="5703929"/>
+            <a:ext cx="6351419" cy="646331"/>
           </a:xfrm>
           <a:prstGeom prst="rect">
             <a:avLst/>
@@ -13153,172 +13106,41 @@
           </a:bodyPr>
           <a:lstStyle/>
           <a:p>
+            <a:pPr algn="ctr"/>
             <a:r>
               <a:rPr lang="en-US" dirty="0"/>
-              <a:t>Pearson Correlation: -0.96</a:t>
-            </a:r>
-          </a:p>
-        </p:txBody>
-      </p:sp>
-      <p:sp>
-        <p:nvSpPr>
-          <p:cNvPr id="13" name="TextBox 12">
-            <a:extLst>
-              <a:ext uri="{FF2B5EF4-FFF2-40B4-BE49-F238E27FC236}">
-                <a16:creationId xmlns:a16="http://schemas.microsoft.com/office/drawing/2014/main" id="{BCC03D83-F00D-42E8-B8FF-4677A0AA8A2A}"/>
-              </a:ext>
-            </a:extLst>
-          </p:cNvPr>
-          <p:cNvSpPr txBox="1"/>
+              <a:t>Rank Category is negatively correlated to one-year returns.</a:t>
+            </a:r>
+          </a:p>
+          <a:p>
+            <a:pPr algn="ctr"/>
+            <a:r>
+              <a:rPr lang="en-US" dirty="0"/>
+              <a:t>(Pearson Correlation: -0.96)</a:t>
+            </a:r>
+          </a:p>
+        </p:txBody>
+      </p:sp>
+      <p:sp>
+        <p:nvSpPr>
+          <p:cNvPr id="15" name="Rectangle 14">
+            <a:extLst>
+              <a:ext uri="{FF2B5EF4-FFF2-40B4-BE49-F238E27FC236}">
+                <a16:creationId xmlns:a16="http://schemas.microsoft.com/office/drawing/2014/main" id="{64D65E2B-3610-4595-BCDE-84639024D5AE}"/>
+              </a:ext>
+            </a:extLst>
+          </p:cNvPr>
+          <p:cNvSpPr/>
           <p:nvPr/>
         </p:nvSpPr>
         <p:spPr>
           <a:xfrm>
-            <a:off x="2129670" y="5571382"/>
-            <a:ext cx="6335389" cy="369332"/>
+            <a:off x="816100" y="1132711"/>
+            <a:ext cx="8845295" cy="369332"/>
           </a:xfrm>
           <a:prstGeom prst="rect">
             <a:avLst/>
           </a:prstGeom>
-          <a:noFill/>
-        </p:spPr>
-        <p:txBody>
-          <a:bodyPr wrap="none" rtlCol="0">
-            <a:spAutoFit/>
-          </a:bodyPr>
-          <a:lstStyle/>
-          <a:p>
-            <a:r>
-              <a:rPr lang="en-US" dirty="0"/>
-              <a:t>Rank Category is negatively correlated to one-year returns.</a:t>
-            </a:r>
-          </a:p>
-        </p:txBody>
-      </p:sp>
-      <p:sp>
-        <p:nvSpPr>
-          <p:cNvPr id="12" name="Rectangle 11">
-            <a:extLst>
-              <a:ext uri="{FF2B5EF4-FFF2-40B4-BE49-F238E27FC236}">
-                <a16:creationId xmlns:a16="http://schemas.microsoft.com/office/drawing/2014/main" id="{C6E46289-81D7-4326-80B4-759FE2596694}"/>
-              </a:ext>
-            </a:extLst>
-          </p:cNvPr>
-          <p:cNvSpPr/>
-          <p:nvPr/>
-        </p:nvSpPr>
-        <p:spPr>
-          <a:xfrm>
-            <a:off x="3719145" y="2435470"/>
-            <a:ext cx="3156441" cy="334108"/>
-          </a:xfrm>
-          <a:prstGeom prst="rect">
-            <a:avLst/>
-          </a:prstGeom>
-          <a:noFill/>
-          <a:ln>
-            <a:solidFill>
-              <a:srgbClr val="0070C0"/>
-            </a:solidFill>
-          </a:ln>
-        </p:spPr>
-        <p:style>
-          <a:lnRef idx="2">
-            <a:schemeClr val="accent1">
-              <a:shade val="50000"/>
-            </a:schemeClr>
-          </a:lnRef>
-          <a:fillRef idx="1">
-            <a:schemeClr val="accent1"/>
-          </a:fillRef>
-          <a:effectRef idx="0">
-            <a:schemeClr val="accent1"/>
-          </a:effectRef>
-          <a:fontRef idx="minor">
-            <a:schemeClr val="lt1"/>
-          </a:fontRef>
-        </p:style>
-        <p:txBody>
-          <a:bodyPr rtlCol="0" anchor="ctr"/>
-          <a:lstStyle/>
-          <a:p>
-            <a:pPr algn="ctr"/>
-            <a:endParaRPr lang="en-US"/>
-          </a:p>
-        </p:txBody>
-      </p:sp>
-      <p:sp>
-        <p:nvSpPr>
-          <p:cNvPr id="14" name="Star: 5 Points 13">
-            <a:extLst>
-              <a:ext uri="{FF2B5EF4-FFF2-40B4-BE49-F238E27FC236}">
-                <a16:creationId xmlns:a16="http://schemas.microsoft.com/office/drawing/2014/main" id="{216C379B-0DD3-4937-9873-5636A173B9B0}"/>
-              </a:ext>
-            </a:extLst>
-          </p:cNvPr>
-          <p:cNvSpPr/>
-          <p:nvPr/>
-        </p:nvSpPr>
-        <p:spPr>
-          <a:xfrm>
-            <a:off x="3854195" y="2519951"/>
-            <a:ext cx="151934" cy="165145"/>
-          </a:xfrm>
-          <a:prstGeom prst="star5">
-            <a:avLst/>
-          </a:prstGeom>
-          <a:noFill/>
-          <a:ln>
-            <a:solidFill>
-              <a:srgbClr val="0070C0"/>
-            </a:solidFill>
-          </a:ln>
-        </p:spPr>
-        <p:style>
-          <a:lnRef idx="2">
-            <a:schemeClr val="accent1">
-              <a:shade val="50000"/>
-            </a:schemeClr>
-          </a:lnRef>
-          <a:fillRef idx="1">
-            <a:schemeClr val="accent1"/>
-          </a:fillRef>
-          <a:effectRef idx="0">
-            <a:schemeClr val="accent1"/>
-          </a:effectRef>
-          <a:fontRef idx="minor">
-            <a:schemeClr val="lt1"/>
-          </a:fontRef>
-        </p:style>
-        <p:txBody>
-          <a:bodyPr rtlCol="0" anchor="ctr"/>
-          <a:lstStyle/>
-          <a:p>
-            <a:pPr algn="ctr"/>
-            <a:endParaRPr lang="en-US"/>
-          </a:p>
-        </p:txBody>
-      </p:sp>
-      <p:sp>
-        <p:nvSpPr>
-          <p:cNvPr id="15" name="Rectangle 14">
-            <a:extLst>
-              <a:ext uri="{FF2B5EF4-FFF2-40B4-BE49-F238E27FC236}">
-                <a16:creationId xmlns:a16="http://schemas.microsoft.com/office/drawing/2014/main" id="{64D65E2B-3610-4595-BCDE-84639024D5AE}"/>
-              </a:ext>
-            </a:extLst>
-          </p:cNvPr>
-          <p:cNvSpPr/>
-          <p:nvPr/>
-        </p:nvSpPr>
-        <p:spPr>
-          <a:xfrm>
-            <a:off x="816102" y="1286618"/>
-            <a:ext cx="8845295" cy="369332"/>
-          </a:xfrm>
-          <a:prstGeom prst="rect">
-            <a:avLst/>
-          </a:prstGeom>
         </p:spPr>
         <p:txBody>
           <a:bodyPr wrap="square">
@@ -13333,6 +13155,273 @@
           </a:p>
         </p:txBody>
       </p:sp>
+      <p:grpSp>
+        <p:nvGrpSpPr>
+          <p:cNvPr id="2" name="Group 1">
+            <a:extLst>
+              <a:ext uri="{FF2B5EF4-FFF2-40B4-BE49-F238E27FC236}">
+                <a16:creationId xmlns:a16="http://schemas.microsoft.com/office/drawing/2014/main" id="{F79FD8E9-0B60-42B4-8859-FF40CF3829F5}"/>
+              </a:ext>
+            </a:extLst>
+          </p:cNvPr>
+          <p:cNvGrpSpPr/>
+          <p:nvPr/>
+        </p:nvGrpSpPr>
+        <p:grpSpPr>
+          <a:xfrm>
+            <a:off x="1865431" y="1578996"/>
+            <a:ext cx="6746631" cy="4047979"/>
+            <a:chOff x="1865431" y="1578996"/>
+            <a:chExt cx="6746631" cy="4047979"/>
+          </a:xfrm>
+        </p:grpSpPr>
+        <p:pic>
+          <p:nvPicPr>
+            <p:cNvPr id="3" name="Picture 2" descr="A picture containing drawing&#10;&#10;Description automatically generated">
+              <a:extLst>
+                <a:ext uri="{FF2B5EF4-FFF2-40B4-BE49-F238E27FC236}">
+                  <a16:creationId xmlns:a16="http://schemas.microsoft.com/office/drawing/2014/main" id="{7D15C0BD-ABBF-4AB3-B679-955B4FF1B77A}"/>
+                </a:ext>
+              </a:extLst>
+            </p:cNvPr>
+            <p:cNvPicPr>
+              <a:picLocks noChangeAspect="1"/>
+            </p:cNvPicPr>
+            <p:nvPr/>
+          </p:nvPicPr>
+          <p:blipFill>
+            <a:blip r:embed="rId2">
+              <a:extLst>
+                <a:ext uri="{28A0092B-C50C-407E-A947-70E740481C1C}">
+                  <a14:useLocalDpi xmlns:a14="http://schemas.microsoft.com/office/drawing/2010/main" val="0"/>
+                </a:ext>
+              </a:extLst>
+            </a:blip>
+            <a:stretch>
+              <a:fillRect/>
+            </a:stretch>
+          </p:blipFill>
+          <p:spPr>
+            <a:xfrm>
+              <a:off x="1865431" y="1578996"/>
+              <a:ext cx="6746631" cy="4047979"/>
+            </a:xfrm>
+            <a:prstGeom prst="rect">
+              <a:avLst/>
+            </a:prstGeom>
+          </p:spPr>
+        </p:pic>
+        <p:sp>
+          <p:nvSpPr>
+            <p:cNvPr id="7" name="TextBox 6">
+              <a:extLst>
+                <a:ext uri="{FF2B5EF4-FFF2-40B4-BE49-F238E27FC236}">
+                  <a16:creationId xmlns:a16="http://schemas.microsoft.com/office/drawing/2014/main" id="{3CB4EE3A-C31C-4D38-9EAE-2BE54FE19B92}"/>
+                </a:ext>
+              </a:extLst>
+            </p:cNvPr>
+            <p:cNvSpPr txBox="1"/>
+            <p:nvPr/>
+          </p:nvSpPr>
+          <p:spPr>
+            <a:xfrm>
+              <a:off x="2597103" y="2127738"/>
+              <a:ext cx="574196" cy="276999"/>
+            </a:xfrm>
+            <a:prstGeom prst="rect">
+              <a:avLst/>
+            </a:prstGeom>
+            <a:noFill/>
+          </p:spPr>
+          <p:txBody>
+            <a:bodyPr wrap="none" rtlCol="0">
+              <a:spAutoFit/>
+            </a:bodyPr>
+            <a:lstStyle/>
+            <a:p>
+              <a:r>
+                <a:rPr lang="en-US" sz="1200" dirty="0"/>
+                <a:t>23.3%</a:t>
+              </a:r>
+            </a:p>
+          </p:txBody>
+        </p:sp>
+        <p:sp>
+          <p:nvSpPr>
+            <p:cNvPr id="16" name="TextBox 15">
+              <a:extLst>
+                <a:ext uri="{FF2B5EF4-FFF2-40B4-BE49-F238E27FC236}">
+                  <a16:creationId xmlns:a16="http://schemas.microsoft.com/office/drawing/2014/main" id="{F8A513DD-779C-4F07-B664-CC83AEA2E885}"/>
+                </a:ext>
+              </a:extLst>
+            </p:cNvPr>
+            <p:cNvSpPr txBox="1"/>
+            <p:nvPr/>
+          </p:nvSpPr>
+          <p:spPr>
+            <a:xfrm>
+              <a:off x="3514434" y="2404737"/>
+              <a:ext cx="574196" cy="276999"/>
+            </a:xfrm>
+            <a:prstGeom prst="rect">
+              <a:avLst/>
+            </a:prstGeom>
+            <a:noFill/>
+          </p:spPr>
+          <p:txBody>
+            <a:bodyPr wrap="none" rtlCol="0">
+              <a:spAutoFit/>
+            </a:bodyPr>
+            <a:lstStyle/>
+            <a:p>
+              <a:r>
+                <a:rPr lang="en-US" sz="1200" dirty="0"/>
+                <a:t>20.8%</a:t>
+              </a:r>
+            </a:p>
+          </p:txBody>
+        </p:sp>
+        <p:sp>
+          <p:nvSpPr>
+            <p:cNvPr id="17" name="TextBox 16">
+              <a:extLst>
+                <a:ext uri="{FF2B5EF4-FFF2-40B4-BE49-F238E27FC236}">
+                  <a16:creationId xmlns:a16="http://schemas.microsoft.com/office/drawing/2014/main" id="{7A47B73C-BD55-4B3F-8811-6E22E729A7B2}"/>
+                </a:ext>
+              </a:extLst>
+            </p:cNvPr>
+            <p:cNvSpPr txBox="1"/>
+            <p:nvPr/>
+          </p:nvSpPr>
+          <p:spPr>
+            <a:xfrm>
+              <a:off x="4431765" y="2266237"/>
+              <a:ext cx="574196" cy="276999"/>
+            </a:xfrm>
+            <a:prstGeom prst="rect">
+              <a:avLst/>
+            </a:prstGeom>
+            <a:noFill/>
+          </p:spPr>
+          <p:txBody>
+            <a:bodyPr wrap="none" rtlCol="0">
+              <a:spAutoFit/>
+            </a:bodyPr>
+            <a:lstStyle/>
+            <a:p>
+              <a:r>
+                <a:rPr lang="en-US" sz="1200" dirty="0"/>
+                <a:t>21.3%</a:t>
+              </a:r>
+            </a:p>
+          </p:txBody>
+        </p:sp>
+        <p:sp>
+          <p:nvSpPr>
+            <p:cNvPr id="18" name="TextBox 17">
+              <a:extLst>
+                <a:ext uri="{FF2B5EF4-FFF2-40B4-BE49-F238E27FC236}">
+                  <a16:creationId xmlns:a16="http://schemas.microsoft.com/office/drawing/2014/main" id="{B303FEDB-DD0D-412B-9A8F-CD1E2A0B7F15}"/>
+                </a:ext>
+              </a:extLst>
+            </p:cNvPr>
+            <p:cNvSpPr txBox="1"/>
+            <p:nvPr/>
+          </p:nvSpPr>
+          <p:spPr>
+            <a:xfrm>
+              <a:off x="5349095" y="2823084"/>
+              <a:ext cx="574196" cy="276999"/>
+            </a:xfrm>
+            <a:prstGeom prst="rect">
+              <a:avLst/>
+            </a:prstGeom>
+            <a:noFill/>
+          </p:spPr>
+          <p:txBody>
+            <a:bodyPr wrap="none" rtlCol="0">
+              <a:spAutoFit/>
+            </a:bodyPr>
+            <a:lstStyle/>
+            <a:p>
+              <a:r>
+                <a:rPr lang="en-US" sz="1200" dirty="0"/>
+                <a:t>17.0%</a:t>
+              </a:r>
+            </a:p>
+          </p:txBody>
+        </p:sp>
+        <p:sp>
+          <p:nvSpPr>
+            <p:cNvPr id="19" name="TextBox 18">
+              <a:extLst>
+                <a:ext uri="{FF2B5EF4-FFF2-40B4-BE49-F238E27FC236}">
+                  <a16:creationId xmlns:a16="http://schemas.microsoft.com/office/drawing/2014/main" id="{34B893A2-BA25-4DA2-90D1-184D3D115897}"/>
+                </a:ext>
+              </a:extLst>
+            </p:cNvPr>
+            <p:cNvSpPr txBox="1"/>
+            <p:nvPr/>
+          </p:nvSpPr>
+          <p:spPr>
+            <a:xfrm>
+              <a:off x="6268711" y="2823084"/>
+              <a:ext cx="574196" cy="276999"/>
+            </a:xfrm>
+            <a:prstGeom prst="rect">
+              <a:avLst/>
+            </a:prstGeom>
+            <a:noFill/>
+          </p:spPr>
+          <p:txBody>
+            <a:bodyPr wrap="none" rtlCol="0">
+              <a:spAutoFit/>
+            </a:bodyPr>
+            <a:lstStyle/>
+            <a:p>
+              <a:r>
+                <a:rPr lang="en-US" sz="1200" dirty="0"/>
+                <a:t>16.9%</a:t>
+              </a:r>
+            </a:p>
+          </p:txBody>
+        </p:sp>
+        <p:sp>
+          <p:nvSpPr>
+            <p:cNvPr id="20" name="TextBox 19">
+              <a:extLst>
+                <a:ext uri="{FF2B5EF4-FFF2-40B4-BE49-F238E27FC236}">
+                  <a16:creationId xmlns:a16="http://schemas.microsoft.com/office/drawing/2014/main" id="{C14793F8-D66E-4F39-B538-2EE1E3E68A88}"/>
+                </a:ext>
+              </a:extLst>
+            </p:cNvPr>
+            <p:cNvSpPr txBox="1"/>
+            <p:nvPr/>
+          </p:nvSpPr>
+          <p:spPr>
+            <a:xfrm>
+              <a:off x="7199611" y="3100083"/>
+              <a:ext cx="574196" cy="276999"/>
+            </a:xfrm>
+            <a:prstGeom prst="rect">
+              <a:avLst/>
+            </a:prstGeom>
+            <a:noFill/>
+          </p:spPr>
+          <p:txBody>
+            <a:bodyPr wrap="none" rtlCol="0">
+              <a:spAutoFit/>
+            </a:bodyPr>
+            <a:lstStyle/>
+            <a:p>
+              <a:r>
+                <a:rPr lang="en-US" sz="1200" dirty="0"/>
+                <a:t>14.3%</a:t>
+              </a:r>
+            </a:p>
+          </p:txBody>
+        </p:sp>
+      </p:grpSp>
     </p:spTree>
     <p:extLst>
       <p:ext uri="{BB962C8B-B14F-4D97-AF65-F5344CB8AC3E}">

</xml_diff>